<commit_message>
feat: Added time complexity analysis to docs
</commit_message>
<xml_diff>
--- a/docs/nearest_string_problem.pptx
+++ b/docs/nearest_string_problem.pptx
@@ -118,6 +118,14 @@
 </p:presentation>
 </file>
 
+<file path=ppt/revisionInfo.xml><?xml version="1.0" encoding="utf-8"?>
+<p1510:revInfo xmlns:a="http://schemas.openxmlformats.org/drawingml/2006/main" xmlns:r="http://schemas.openxmlformats.org/officeDocument/2006/relationships" xmlns:p1510="http://schemas.microsoft.com/office/powerpoint/2015/10/main">
+  <p1510:revLst>
+    <p1510:client id="{B12BB232-DFAD-4B11-A514-488CBE4C373F}" v="3" dt="2026-02-07T18:54:31.566"/>
+  </p1510:revLst>
+</p1510:revInfo>
+</file>
+
 <file path=ppt/slideLayouts/slideLayout1.xml><?xml version="1.0" encoding="utf-8"?>
 <p:sldLayout xmlns:a="http://schemas.openxmlformats.org/drawingml/2006/main" xmlns:r="http://schemas.openxmlformats.org/officeDocument/2006/relationships" xmlns:p="http://schemas.openxmlformats.org/presentationml/2006/main" type="title" preserve="1">
   <p:cSld name="Title Slide">
@@ -265,7 +273,7 @@
           <a:p>
             <a:fld id="{27C7DBCF-4B90-4999-9218-3D62E16624EA}" type="datetimeFigureOut">
               <a:rPr lang="en-US" smtClean="0"/>
-              <a:t>2/6/2026</a:t>
+              <a:t>2/7/2026</a:t>
             </a:fld>
             <a:endParaRPr lang="en-US"/>
           </a:p>
@@ -463,7 +471,7 @@
           <a:p>
             <a:fld id="{27C7DBCF-4B90-4999-9218-3D62E16624EA}" type="datetimeFigureOut">
               <a:rPr lang="en-US" smtClean="0"/>
-              <a:t>2/6/2026</a:t>
+              <a:t>2/7/2026</a:t>
             </a:fld>
             <a:endParaRPr lang="en-US"/>
           </a:p>
@@ -671,7 +679,7 @@
           <a:p>
             <a:fld id="{27C7DBCF-4B90-4999-9218-3D62E16624EA}" type="datetimeFigureOut">
               <a:rPr lang="en-US" smtClean="0"/>
-              <a:t>2/6/2026</a:t>
+              <a:t>2/7/2026</a:t>
             </a:fld>
             <a:endParaRPr lang="en-US"/>
           </a:p>
@@ -869,7 +877,7 @@
           <a:p>
             <a:fld id="{27C7DBCF-4B90-4999-9218-3D62E16624EA}" type="datetimeFigureOut">
               <a:rPr lang="en-US" smtClean="0"/>
-              <a:t>2/6/2026</a:t>
+              <a:t>2/7/2026</a:t>
             </a:fld>
             <a:endParaRPr lang="en-US"/>
           </a:p>
@@ -1144,7 +1152,7 @@
           <a:p>
             <a:fld id="{27C7DBCF-4B90-4999-9218-3D62E16624EA}" type="datetimeFigureOut">
               <a:rPr lang="en-US" smtClean="0"/>
-              <a:t>2/6/2026</a:t>
+              <a:t>2/7/2026</a:t>
             </a:fld>
             <a:endParaRPr lang="en-US"/>
           </a:p>
@@ -1409,7 +1417,7 @@
           <a:p>
             <a:fld id="{27C7DBCF-4B90-4999-9218-3D62E16624EA}" type="datetimeFigureOut">
               <a:rPr lang="en-US" smtClean="0"/>
-              <a:t>2/6/2026</a:t>
+              <a:t>2/7/2026</a:t>
             </a:fld>
             <a:endParaRPr lang="en-US"/>
           </a:p>
@@ -1821,7 +1829,7 @@
           <a:p>
             <a:fld id="{27C7DBCF-4B90-4999-9218-3D62E16624EA}" type="datetimeFigureOut">
               <a:rPr lang="en-US" smtClean="0"/>
-              <a:t>2/6/2026</a:t>
+              <a:t>2/7/2026</a:t>
             </a:fld>
             <a:endParaRPr lang="en-US"/>
           </a:p>
@@ -1962,7 +1970,7 @@
           <a:p>
             <a:fld id="{27C7DBCF-4B90-4999-9218-3D62E16624EA}" type="datetimeFigureOut">
               <a:rPr lang="en-US" smtClean="0"/>
-              <a:t>2/6/2026</a:t>
+              <a:t>2/7/2026</a:t>
             </a:fld>
             <a:endParaRPr lang="en-US"/>
           </a:p>
@@ -2075,7 +2083,7 @@
           <a:p>
             <a:fld id="{27C7DBCF-4B90-4999-9218-3D62E16624EA}" type="datetimeFigureOut">
               <a:rPr lang="en-US" smtClean="0"/>
-              <a:t>2/6/2026</a:t>
+              <a:t>2/7/2026</a:t>
             </a:fld>
             <a:endParaRPr lang="en-US"/>
           </a:p>
@@ -2386,7 +2394,7 @@
           <a:p>
             <a:fld id="{27C7DBCF-4B90-4999-9218-3D62E16624EA}" type="datetimeFigureOut">
               <a:rPr lang="en-US" smtClean="0"/>
-              <a:t>2/6/2026</a:t>
+              <a:t>2/7/2026</a:t>
             </a:fld>
             <a:endParaRPr lang="en-US"/>
           </a:p>
@@ -2674,7 +2682,7 @@
           <a:p>
             <a:fld id="{27C7DBCF-4B90-4999-9218-3D62E16624EA}" type="datetimeFigureOut">
               <a:rPr lang="en-US" smtClean="0"/>
-              <a:t>2/6/2026</a:t>
+              <a:t>2/7/2026</a:t>
             </a:fld>
             <a:endParaRPr lang="en-US"/>
           </a:p>
@@ -2915,7 +2923,7 @@
           <a:p>
             <a:fld id="{27C7DBCF-4B90-4999-9218-3D62E16624EA}" type="datetimeFigureOut">
               <a:rPr lang="en-US" smtClean="0"/>
-              <a:t>2/6/2026</a:t>
+              <a:t>2/7/2026</a:t>
             </a:fld>
             <a:endParaRPr lang="en-US"/>
           </a:p>
@@ -4479,8 +4487,8 @@
           </a:p>
         </p:txBody>
       </p:sp>
-      <mc:AlternateContent xmlns:mc="http://schemas.openxmlformats.org/markup-compatibility/2006">
-        <mc:Choice xmlns:a14="http://schemas.microsoft.com/office/drawing/2010/main" Requires="a14">
+      <mc:AlternateContent xmlns:mc="http://schemas.openxmlformats.org/markup-compatibility/2006" xmlns:a14="http://schemas.microsoft.com/office/drawing/2010/main">
+        <mc:Choice Requires="a14">
           <p:sp>
             <p:nvSpPr>
               <p:cNvPr id="3" name="Content Placeholder 2">
@@ -5034,7 +5042,7 @@
             </p:txBody>
           </p:sp>
         </mc:Choice>
-        <mc:Fallback>
+        <mc:Fallback xmlns="">
           <p:sp>
             <p:nvSpPr>
               <p:cNvPr id="3" name="Content Placeholder 2">
@@ -5636,83 +5644,219 @@
           <a:lstStyle/>
           <a:p>
             <a:r>
-              <a:rPr lang="en-US" sz="2000"/>
-              <a:t>Algoritam grube sile podrazumeva:</a:t>
+              <a:rPr lang="en-US" sz="2000" dirty="0" err="1"/>
+              <a:t>Algoritam</a:t>
+            </a:r>
+            <a:r>
+              <a:rPr lang="en-US" sz="2000" dirty="0"/>
+              <a:t> </a:t>
+            </a:r>
+            <a:r>
+              <a:rPr lang="en-US" sz="2000" dirty="0" err="1"/>
+              <a:t>grube</a:t>
+            </a:r>
+            <a:r>
+              <a:rPr lang="en-US" sz="2000" dirty="0"/>
+              <a:t> </a:t>
+            </a:r>
+            <a:r>
+              <a:rPr lang="en-US" sz="2000" dirty="0" err="1"/>
+              <a:t>sile</a:t>
+            </a:r>
+            <a:r>
+              <a:rPr lang="en-US" sz="2000" dirty="0"/>
+              <a:t> </a:t>
+            </a:r>
+            <a:r>
+              <a:rPr lang="en-US" sz="2000" dirty="0" err="1"/>
+              <a:t>podrazumeva</a:t>
+            </a:r>
+            <a:r>
+              <a:rPr lang="en-US" sz="2000" dirty="0"/>
+              <a:t>:</a:t>
             </a:r>
           </a:p>
           <a:p>
             <a:pPr lvl="1"/>
             <a:r>
-              <a:rPr lang="sr-Latn-RS" sz="2000"/>
+              <a:rPr lang="sr-Latn-RS" sz="2000" dirty="0"/>
               <a:t>G</a:t>
             </a:r>
             <a:r>
-              <a:rPr lang="en-US" sz="2000"/>
-              <a:t>enerisanje svih mogu</a:t>
-            </a:r>
-            <a:r>
-              <a:rPr lang="sr-Latn-RS" sz="2000"/>
+              <a:rPr lang="en-US" sz="2000" dirty="0" err="1"/>
+              <a:t>enerisanje</a:t>
+            </a:r>
+            <a:r>
+              <a:rPr lang="en-US" sz="2000" dirty="0"/>
+              <a:t> </a:t>
+            </a:r>
+            <a:r>
+              <a:rPr lang="en-US" sz="2000" dirty="0" err="1"/>
+              <a:t>svih</a:t>
+            </a:r>
+            <a:r>
+              <a:rPr lang="en-US" sz="2000" dirty="0"/>
+              <a:t> </a:t>
+            </a:r>
+            <a:r>
+              <a:rPr lang="en-US" sz="2000" dirty="0" err="1"/>
+              <a:t>mogu</a:t>
+            </a:r>
+            <a:r>
+              <a:rPr lang="sr-Latn-RS" sz="2000" dirty="0"/>
               <a:t>ć</a:t>
             </a:r>
             <a:r>
-              <a:rPr lang="en-US" sz="2000"/>
-              <a:t>ih stringova du</a:t>
-            </a:r>
-            <a:r>
-              <a:rPr lang="sr-Latn-RS" sz="2000"/>
+              <a:rPr lang="en-US" sz="2000" dirty="0" err="1"/>
+              <a:t>ih</a:t>
+            </a:r>
+            <a:r>
+              <a:rPr lang="en-US" sz="2000" dirty="0"/>
+              <a:t> </a:t>
+            </a:r>
+            <a:r>
+              <a:rPr lang="en-US" sz="2000" dirty="0" err="1"/>
+              <a:t>stringova</a:t>
+            </a:r>
+            <a:r>
+              <a:rPr lang="en-US" sz="2000" dirty="0"/>
+              <a:t> du</a:t>
+            </a:r>
+            <a:r>
+              <a:rPr lang="sr-Latn-RS" sz="2000" dirty="0"/>
               <a:t>ž</a:t>
             </a:r>
             <a:r>
-              <a:rPr lang="en-US" sz="2000"/>
-              <a:t>ine m kori</a:t>
-            </a:r>
-            <a:r>
-              <a:rPr lang="sr-Latn-RS" sz="2000"/>
+              <a:rPr lang="en-US" sz="2000" dirty="0" err="1"/>
+              <a:t>ine</a:t>
+            </a:r>
+            <a:r>
+              <a:rPr lang="en-US" sz="2000" dirty="0"/>
+              <a:t> m kori</a:t>
+            </a:r>
+            <a:r>
+              <a:rPr lang="sr-Latn-RS" sz="2000" dirty="0" err="1"/>
               <a:t>šć</a:t>
             </a:r>
             <a:r>
-              <a:rPr lang="en-US" sz="2000"/>
-              <a:t>enjem karaktera iz alfabeta</a:t>
+              <a:rPr lang="en-US" sz="2000" dirty="0" err="1"/>
+              <a:t>enjem</a:t>
+            </a:r>
+            <a:r>
+              <a:rPr lang="en-US" sz="2000" dirty="0"/>
+              <a:t> </a:t>
+            </a:r>
+            <a:r>
+              <a:rPr lang="en-US" sz="2000" dirty="0" err="1"/>
+              <a:t>karaktera</a:t>
+            </a:r>
+            <a:r>
+              <a:rPr lang="en-US" sz="2000" dirty="0"/>
+              <a:t> </a:t>
+            </a:r>
+            <a:r>
+              <a:rPr lang="en-US" sz="2000" dirty="0" err="1"/>
+              <a:t>iz</a:t>
+            </a:r>
+            <a:r>
+              <a:rPr lang="en-US" sz="2000" dirty="0"/>
+              <a:t> </a:t>
+            </a:r>
+            <a:r>
+              <a:rPr lang="en-US" sz="2000" dirty="0" err="1"/>
+              <a:t>alfabeta</a:t>
             </a:r>
           </a:p>
           <a:p>
             <a:pPr lvl="1"/>
             <a:r>
-              <a:rPr lang="en-US" sz="2000"/>
+              <a:rPr lang="en-US" sz="2000" dirty="0"/>
               <a:t>Ra</a:t>
             </a:r>
             <a:r>
-              <a:rPr lang="sr-Latn-RS" sz="2000"/>
-              <a:t>čunanje </a:t>
-            </a:r>
-            <a:r>
-              <a:rPr lang="en-US" sz="2000"/>
-              <a:t>njihovih maksimalnih Hemingovih distanc</a:t>
-            </a:r>
-            <a:r>
-              <a:rPr lang="sr-Latn-RS" sz="2000"/>
+              <a:rPr lang="sr-Latn-RS" sz="2000" dirty="0" err="1"/>
+              <a:t>čunanje</a:t>
+            </a:r>
+            <a:r>
+              <a:rPr lang="sr-Latn-RS" sz="2000" dirty="0"/>
+              <a:t> </a:t>
+            </a:r>
+            <a:r>
+              <a:rPr lang="en-US" sz="2000" dirty="0" err="1"/>
+              <a:t>njihovih</a:t>
+            </a:r>
+            <a:r>
+              <a:rPr lang="en-US" sz="2000" dirty="0"/>
+              <a:t> </a:t>
+            </a:r>
+            <a:r>
+              <a:rPr lang="en-US" sz="2000" dirty="0" err="1"/>
+              <a:t>maksimalnih</a:t>
+            </a:r>
+            <a:r>
+              <a:rPr lang="en-US" sz="2000" dirty="0"/>
+              <a:t> </a:t>
+            </a:r>
+            <a:r>
+              <a:rPr lang="en-US" sz="2000" dirty="0" err="1"/>
+              <a:t>Hamingovih</a:t>
+            </a:r>
+            <a:r>
+              <a:rPr lang="en-US" sz="2000" dirty="0"/>
+              <a:t> </a:t>
+            </a:r>
+            <a:r>
+              <a:rPr lang="en-US" sz="2000" dirty="0" err="1"/>
+              <a:t>distanc</a:t>
+            </a:r>
+            <a:r>
+              <a:rPr lang="sr-Latn-RS" sz="2000" dirty="0"/>
               <a:t>i</a:t>
             </a:r>
           </a:p>
           <a:p>
             <a:pPr lvl="1"/>
             <a:r>
-              <a:rPr lang="sr-Latn-RS" sz="2000"/>
+              <a:rPr lang="sr-Latn-RS" sz="2000" dirty="0"/>
               <a:t>Poređenje </a:t>
             </a:r>
             <a:r>
-              <a:rPr lang="en-US" sz="2000"/>
-              <a:t>Hemingovih distanc</a:t>
-            </a:r>
-            <a:r>
-              <a:rPr lang="sr-Latn-RS" sz="2000"/>
+              <a:rPr lang="en-US" sz="2000" dirty="0" err="1"/>
+              <a:t>Hamingovih</a:t>
+            </a:r>
+            <a:r>
+              <a:rPr lang="en-US" sz="2000" dirty="0"/>
+              <a:t> </a:t>
+            </a:r>
+            <a:r>
+              <a:rPr lang="en-US" sz="2000" dirty="0" err="1"/>
+              <a:t>distanc</a:t>
+            </a:r>
+            <a:r>
+              <a:rPr lang="sr-Latn-RS" sz="2000" dirty="0"/>
               <a:t>i</a:t>
             </a:r>
             <a:r>
-              <a:rPr lang="en-US" sz="2000"/>
-              <a:t> u potrazi za najmanjom.</a:t>
-            </a:r>
-            <a:endParaRPr lang="sr-Latn-RS" sz="2000"/>
+              <a:rPr lang="en-US" sz="2000" dirty="0"/>
+              <a:t> u </a:t>
+            </a:r>
+            <a:r>
+              <a:rPr lang="en-US" sz="2000" dirty="0" err="1"/>
+              <a:t>potrazi</a:t>
+            </a:r>
+            <a:r>
+              <a:rPr lang="en-US" sz="2000" dirty="0"/>
+              <a:t> za </a:t>
+            </a:r>
+            <a:r>
+              <a:rPr lang="en-US" sz="2000" dirty="0" err="1"/>
+              <a:t>najmanjom</a:t>
+            </a:r>
+            <a:r>
+              <a:rPr lang="en-US" sz="2000" dirty="0"/>
+              <a:t>.</a:t>
+            </a:r>
+            <a:endParaRPr lang="sr-Latn-RS" sz="2000" dirty="0"/>
           </a:p>
           <a:p>
             <a:endParaRPr lang="en-US" sz="2000" dirty="0"/>

</xml_diff>

<commit_message>
fix: GA slide update in presentation
</commit_message>
<xml_diff>
--- a/docs/nearest_string_problem.pptx
+++ b/docs/nearest_string_problem.pptx
@@ -121,7 +121,7 @@
 <file path=ppt/revisionInfo.xml><?xml version="1.0" encoding="utf-8"?>
 <p1510:revInfo xmlns:a="http://schemas.openxmlformats.org/drawingml/2006/main" xmlns:r="http://schemas.openxmlformats.org/officeDocument/2006/relationships" xmlns:p1510="http://schemas.microsoft.com/office/powerpoint/2015/10/main">
   <p1510:revLst>
-    <p1510:client id="{B12BB232-DFAD-4B11-A514-488CBE4C373F}" v="3" dt="2026-02-07T18:54:31.566"/>
+    <p1510:client id="{B1417B8E-37CB-4875-92A7-622EA9D60256}" v="33" dt="2026-02-09T23:12:45.284"/>
   </p1510:revLst>
 </p1510:revInfo>
 </file>
@@ -273,7 +273,7 @@
           <a:p>
             <a:fld id="{27C7DBCF-4B90-4999-9218-3D62E16624EA}" type="datetimeFigureOut">
               <a:rPr lang="en-US" smtClean="0"/>
-              <a:t>2/7/2026</a:t>
+              <a:t>2/9/2026</a:t>
             </a:fld>
             <a:endParaRPr lang="en-US"/>
           </a:p>
@@ -471,7 +471,7 @@
           <a:p>
             <a:fld id="{27C7DBCF-4B90-4999-9218-3D62E16624EA}" type="datetimeFigureOut">
               <a:rPr lang="en-US" smtClean="0"/>
-              <a:t>2/7/2026</a:t>
+              <a:t>2/9/2026</a:t>
             </a:fld>
             <a:endParaRPr lang="en-US"/>
           </a:p>
@@ -679,7 +679,7 @@
           <a:p>
             <a:fld id="{27C7DBCF-4B90-4999-9218-3D62E16624EA}" type="datetimeFigureOut">
               <a:rPr lang="en-US" smtClean="0"/>
-              <a:t>2/7/2026</a:t>
+              <a:t>2/9/2026</a:t>
             </a:fld>
             <a:endParaRPr lang="en-US"/>
           </a:p>
@@ -877,7 +877,7 @@
           <a:p>
             <a:fld id="{27C7DBCF-4B90-4999-9218-3D62E16624EA}" type="datetimeFigureOut">
               <a:rPr lang="en-US" smtClean="0"/>
-              <a:t>2/7/2026</a:t>
+              <a:t>2/9/2026</a:t>
             </a:fld>
             <a:endParaRPr lang="en-US"/>
           </a:p>
@@ -1152,7 +1152,7 @@
           <a:p>
             <a:fld id="{27C7DBCF-4B90-4999-9218-3D62E16624EA}" type="datetimeFigureOut">
               <a:rPr lang="en-US" smtClean="0"/>
-              <a:t>2/7/2026</a:t>
+              <a:t>2/9/2026</a:t>
             </a:fld>
             <a:endParaRPr lang="en-US"/>
           </a:p>
@@ -1417,7 +1417,7 @@
           <a:p>
             <a:fld id="{27C7DBCF-4B90-4999-9218-3D62E16624EA}" type="datetimeFigureOut">
               <a:rPr lang="en-US" smtClean="0"/>
-              <a:t>2/7/2026</a:t>
+              <a:t>2/9/2026</a:t>
             </a:fld>
             <a:endParaRPr lang="en-US"/>
           </a:p>
@@ -1829,7 +1829,7 @@
           <a:p>
             <a:fld id="{27C7DBCF-4B90-4999-9218-3D62E16624EA}" type="datetimeFigureOut">
               <a:rPr lang="en-US" smtClean="0"/>
-              <a:t>2/7/2026</a:t>
+              <a:t>2/9/2026</a:t>
             </a:fld>
             <a:endParaRPr lang="en-US"/>
           </a:p>
@@ -1970,7 +1970,7 @@
           <a:p>
             <a:fld id="{27C7DBCF-4B90-4999-9218-3D62E16624EA}" type="datetimeFigureOut">
               <a:rPr lang="en-US" smtClean="0"/>
-              <a:t>2/7/2026</a:t>
+              <a:t>2/9/2026</a:t>
             </a:fld>
             <a:endParaRPr lang="en-US"/>
           </a:p>
@@ -2083,7 +2083,7 @@
           <a:p>
             <a:fld id="{27C7DBCF-4B90-4999-9218-3D62E16624EA}" type="datetimeFigureOut">
               <a:rPr lang="en-US" smtClean="0"/>
-              <a:t>2/7/2026</a:t>
+              <a:t>2/9/2026</a:t>
             </a:fld>
             <a:endParaRPr lang="en-US"/>
           </a:p>
@@ -2394,7 +2394,7 @@
           <a:p>
             <a:fld id="{27C7DBCF-4B90-4999-9218-3D62E16624EA}" type="datetimeFigureOut">
               <a:rPr lang="en-US" smtClean="0"/>
-              <a:t>2/7/2026</a:t>
+              <a:t>2/9/2026</a:t>
             </a:fld>
             <a:endParaRPr lang="en-US"/>
           </a:p>
@@ -2682,7 +2682,7 @@
           <a:p>
             <a:fld id="{27C7DBCF-4B90-4999-9218-3D62E16624EA}" type="datetimeFigureOut">
               <a:rPr lang="en-US" smtClean="0"/>
-              <a:t>2/7/2026</a:t>
+              <a:t>2/9/2026</a:t>
             </a:fld>
             <a:endParaRPr lang="en-US"/>
           </a:p>
@@ -2923,7 +2923,7 @@
           <a:p>
             <a:fld id="{27C7DBCF-4B90-4999-9218-3D62E16624EA}" type="datetimeFigureOut">
               <a:rPr lang="en-US" smtClean="0"/>
-              <a:t>2/7/2026</a:t>
+              <a:t>2/9/2026</a:t>
             </a:fld>
             <a:endParaRPr lang="en-US"/>
           </a:p>
@@ -7040,71 +7040,633 @@
           <a:lstStyle/>
           <a:p>
             <a:r>
-              <a:rPr lang="en-US" sz="2000"/>
-              <a:t>Genetski algoritam predstavlja populacionu metaheuristiku inspirisanu procesima prirodne selekcije i evolucije.</a:t>
-            </a:r>
-            <a:endParaRPr lang="sr-Latn-RS" sz="2000"/>
-          </a:p>
-          <a:p>
-            <a:r>
-              <a:rPr lang="en-US" sz="2000"/>
-              <a:t>U ovom pristupu, svako kandidat-rešenje Nearest String problema predstavlja jednu jedinku u populaciji, dok se iterativnim primenom selekcije, ukrštanja i mutacije populacija evoluira ka kvalitetnijim rešenjima.</a:t>
-            </a:r>
-            <a:endParaRPr lang="sr-Latn-RS" sz="2000"/>
-          </a:p>
-          <a:p>
-            <a:r>
-              <a:rPr lang="en-US" sz="2000"/>
-              <a:t>Algoritam se sastoji od sledećih faza:</a:t>
-            </a:r>
-            <a:endParaRPr lang="sr-Latn-RS" sz="2000"/>
+              <a:rPr lang="en-US" sz="2000" dirty="0" err="1">
+                <a:ea typeface="+mn-lt"/>
+                <a:cs typeface="+mn-lt"/>
+              </a:rPr>
+              <a:t>Genetski</a:t>
+            </a:r>
+            <a:r>
+              <a:rPr lang="en-US" sz="2000" dirty="0">
+                <a:ea typeface="+mn-lt"/>
+                <a:cs typeface="+mn-lt"/>
+              </a:rPr>
+              <a:t> </a:t>
+            </a:r>
+            <a:r>
+              <a:rPr lang="en-US" sz="2000" dirty="0" err="1">
+                <a:ea typeface="+mn-lt"/>
+                <a:cs typeface="+mn-lt"/>
+              </a:rPr>
+              <a:t>algoritam</a:t>
+            </a:r>
+            <a:r>
+              <a:rPr lang="en-US" sz="2000" dirty="0">
+                <a:ea typeface="+mn-lt"/>
+                <a:cs typeface="+mn-lt"/>
+              </a:rPr>
+              <a:t> </a:t>
+            </a:r>
+            <a:r>
+              <a:rPr lang="en-US" sz="2000" dirty="0" err="1">
+                <a:ea typeface="+mn-lt"/>
+                <a:cs typeface="+mn-lt"/>
+              </a:rPr>
+              <a:t>predstavlja</a:t>
+            </a:r>
+            <a:r>
+              <a:rPr lang="en-US" sz="2000" dirty="0">
+                <a:ea typeface="+mn-lt"/>
+                <a:cs typeface="+mn-lt"/>
+              </a:rPr>
+              <a:t> </a:t>
+            </a:r>
+            <a:r>
+              <a:rPr lang="en-US" sz="2000" dirty="0" err="1">
+                <a:ea typeface="+mn-lt"/>
+                <a:cs typeface="+mn-lt"/>
+              </a:rPr>
+              <a:t>populacionu</a:t>
+            </a:r>
+            <a:r>
+              <a:rPr lang="en-US" sz="2000" dirty="0">
+                <a:ea typeface="+mn-lt"/>
+                <a:cs typeface="+mn-lt"/>
+              </a:rPr>
+              <a:t> </a:t>
+            </a:r>
+            <a:r>
+              <a:rPr lang="en-US" sz="2000" dirty="0" err="1">
+                <a:ea typeface="+mn-lt"/>
+                <a:cs typeface="+mn-lt"/>
+              </a:rPr>
+              <a:t>metaheuristiku</a:t>
+            </a:r>
+            <a:r>
+              <a:rPr lang="en-US" sz="2000" dirty="0">
+                <a:ea typeface="+mn-lt"/>
+                <a:cs typeface="+mn-lt"/>
+              </a:rPr>
+              <a:t> </a:t>
+            </a:r>
+            <a:r>
+              <a:rPr lang="en-US" sz="2000" dirty="0" err="1">
+                <a:ea typeface="+mn-lt"/>
+                <a:cs typeface="+mn-lt"/>
+              </a:rPr>
+              <a:t>inspirisanu</a:t>
+            </a:r>
+            <a:r>
+              <a:rPr lang="en-US" sz="2000" dirty="0">
+                <a:ea typeface="+mn-lt"/>
+                <a:cs typeface="+mn-lt"/>
+              </a:rPr>
+              <a:t> </a:t>
+            </a:r>
+            <a:r>
+              <a:rPr lang="en-US" sz="2000" dirty="0" err="1">
+                <a:ea typeface="+mn-lt"/>
+                <a:cs typeface="+mn-lt"/>
+              </a:rPr>
+              <a:t>prirodnom</a:t>
+            </a:r>
+            <a:r>
+              <a:rPr lang="en-US" sz="2000" dirty="0">
+                <a:ea typeface="+mn-lt"/>
+                <a:cs typeface="+mn-lt"/>
+              </a:rPr>
+              <a:t> </a:t>
+            </a:r>
+            <a:r>
+              <a:rPr lang="en-US" sz="2000" dirty="0" err="1">
+                <a:ea typeface="+mn-lt"/>
+                <a:cs typeface="+mn-lt"/>
+              </a:rPr>
+              <a:t>selekcijom</a:t>
+            </a:r>
+            <a:r>
+              <a:rPr lang="en-US" sz="2000" dirty="0">
+                <a:ea typeface="+mn-lt"/>
+                <a:cs typeface="+mn-lt"/>
+              </a:rPr>
+              <a:t> </a:t>
+            </a:r>
+            <a:r>
+              <a:rPr lang="en-US" sz="2000" dirty="0" err="1">
+                <a:ea typeface="+mn-lt"/>
+                <a:cs typeface="+mn-lt"/>
+              </a:rPr>
+              <a:t>i</a:t>
+            </a:r>
+            <a:r>
+              <a:rPr lang="en-US" sz="2000" dirty="0">
+                <a:ea typeface="+mn-lt"/>
+                <a:cs typeface="+mn-lt"/>
+              </a:rPr>
+              <a:t> </a:t>
+            </a:r>
+            <a:r>
+              <a:rPr lang="en-US" sz="2000" dirty="0" err="1">
+                <a:ea typeface="+mn-lt"/>
+                <a:cs typeface="+mn-lt"/>
+              </a:rPr>
+              <a:t>evolucijom</a:t>
+            </a:r>
+            <a:r>
+              <a:rPr lang="en-US" sz="2000" dirty="0">
+                <a:ea typeface="+mn-lt"/>
+                <a:cs typeface="+mn-lt"/>
+              </a:rPr>
+              <a:t>.</a:t>
+            </a:r>
+            <a:endParaRPr lang="sr-Latn-RS" sz="2000" dirty="0">
+              <a:ea typeface="+mn-lt"/>
+              <a:cs typeface="+mn-lt"/>
+            </a:endParaRPr>
+          </a:p>
+          <a:p>
+            <a:r>
+              <a:rPr lang="en-US" sz="2000" dirty="0" err="1">
+                <a:ea typeface="+mn-lt"/>
+                <a:cs typeface="+mn-lt"/>
+              </a:rPr>
+              <a:t>Svaki</a:t>
+            </a:r>
+            <a:r>
+              <a:rPr lang="en-US" sz="2000" dirty="0">
+                <a:ea typeface="+mn-lt"/>
+                <a:cs typeface="+mn-lt"/>
+              </a:rPr>
+              <a:t> </a:t>
+            </a:r>
+            <a:r>
+              <a:rPr lang="en-US" sz="2000" dirty="0" err="1">
+                <a:ea typeface="+mn-lt"/>
+                <a:cs typeface="+mn-lt"/>
+              </a:rPr>
+              <a:t>kandidat</a:t>
+            </a:r>
+            <a:r>
+              <a:rPr lang="en-US" sz="2000" dirty="0">
+                <a:ea typeface="+mn-lt"/>
+                <a:cs typeface="+mn-lt"/>
+              </a:rPr>
+              <a:t> za </a:t>
+            </a:r>
+            <a:r>
+              <a:rPr lang="en-US" sz="2000" dirty="0" err="1">
+                <a:ea typeface="+mn-lt"/>
+                <a:cs typeface="+mn-lt"/>
+              </a:rPr>
+              <a:t>rešenje</a:t>
+            </a:r>
+            <a:r>
+              <a:rPr lang="en-US" sz="2000" dirty="0">
+                <a:ea typeface="+mn-lt"/>
+                <a:cs typeface="+mn-lt"/>
+              </a:rPr>
+              <a:t> Nearest String </a:t>
+            </a:r>
+            <a:r>
+              <a:rPr lang="en-US" sz="2000" dirty="0" err="1">
+                <a:ea typeface="+mn-lt"/>
+                <a:cs typeface="+mn-lt"/>
+              </a:rPr>
+              <a:t>problema</a:t>
+            </a:r>
+            <a:r>
+              <a:rPr lang="en-US" sz="2000" dirty="0">
+                <a:ea typeface="+mn-lt"/>
+                <a:cs typeface="+mn-lt"/>
+              </a:rPr>
+              <a:t> </a:t>
+            </a:r>
+            <a:r>
+              <a:rPr lang="en-US" sz="2000" dirty="0" err="1">
+                <a:ea typeface="+mn-lt"/>
+                <a:cs typeface="+mn-lt"/>
+              </a:rPr>
+              <a:t>predstavlja</a:t>
+            </a:r>
+            <a:r>
+              <a:rPr lang="en-US" sz="2000" dirty="0">
+                <a:ea typeface="+mn-lt"/>
+                <a:cs typeface="+mn-lt"/>
+              </a:rPr>
+              <a:t> </a:t>
+            </a:r>
+            <a:r>
+              <a:rPr lang="en-US" sz="2000" dirty="0" err="1">
+                <a:ea typeface="+mn-lt"/>
+                <a:cs typeface="+mn-lt"/>
+              </a:rPr>
+              <a:t>jednu</a:t>
+            </a:r>
+            <a:r>
+              <a:rPr lang="en-US" sz="2000" dirty="0">
+                <a:ea typeface="+mn-lt"/>
+                <a:cs typeface="+mn-lt"/>
+              </a:rPr>
+              <a:t> </a:t>
+            </a:r>
+            <a:r>
+              <a:rPr lang="en-US" sz="2000" dirty="0" err="1">
+                <a:ea typeface="+mn-lt"/>
+                <a:cs typeface="+mn-lt"/>
+              </a:rPr>
+              <a:t>jedinku</a:t>
+            </a:r>
+            <a:r>
+              <a:rPr lang="en-US" sz="2000" dirty="0">
+                <a:ea typeface="+mn-lt"/>
+                <a:cs typeface="+mn-lt"/>
+              </a:rPr>
+              <a:t> u </a:t>
+            </a:r>
+            <a:r>
+              <a:rPr lang="en-US" sz="2000" dirty="0" err="1">
+                <a:ea typeface="+mn-lt"/>
+                <a:cs typeface="+mn-lt"/>
+              </a:rPr>
+              <a:t>populaciji</a:t>
+            </a:r>
+            <a:r>
+              <a:rPr lang="en-US" sz="2000" dirty="0">
+                <a:ea typeface="+mn-lt"/>
+                <a:cs typeface="+mn-lt"/>
+              </a:rPr>
+              <a:t>.</a:t>
+            </a:r>
+            <a:endParaRPr lang="sr-Latn-RS" dirty="0">
+              <a:ea typeface="+mn-lt"/>
+              <a:cs typeface="+mn-lt"/>
+            </a:endParaRPr>
+          </a:p>
+          <a:p>
+            <a:r>
+              <a:rPr lang="en-US" sz="2000" dirty="0" err="1">
+                <a:ea typeface="+mn-lt"/>
+                <a:cs typeface="+mn-lt"/>
+              </a:rPr>
+              <a:t>Algoritam</a:t>
+            </a:r>
+            <a:r>
+              <a:rPr lang="en-US" sz="2000" dirty="0">
+                <a:ea typeface="+mn-lt"/>
+                <a:cs typeface="+mn-lt"/>
+              </a:rPr>
+              <a:t> se </a:t>
+            </a:r>
+            <a:r>
+              <a:rPr lang="en-US" sz="2000" dirty="0" err="1">
+                <a:ea typeface="+mn-lt"/>
+                <a:cs typeface="+mn-lt"/>
+              </a:rPr>
+              <a:t>sastoji</a:t>
+            </a:r>
+            <a:r>
+              <a:rPr lang="en-US" sz="2000" dirty="0">
+                <a:ea typeface="+mn-lt"/>
+                <a:cs typeface="+mn-lt"/>
+              </a:rPr>
+              <a:t> od </a:t>
+            </a:r>
+            <a:r>
+              <a:rPr lang="en-US" sz="2000" dirty="0" err="1">
+                <a:ea typeface="+mn-lt"/>
+                <a:cs typeface="+mn-lt"/>
+              </a:rPr>
+              <a:t>sledećih</a:t>
+            </a:r>
+            <a:r>
+              <a:rPr lang="en-US" sz="2000" dirty="0">
+                <a:ea typeface="+mn-lt"/>
+                <a:cs typeface="+mn-lt"/>
+              </a:rPr>
+              <a:t> </a:t>
+            </a:r>
+            <a:r>
+              <a:rPr lang="en-US" sz="2000" dirty="0" err="1">
+                <a:ea typeface="+mn-lt"/>
+                <a:cs typeface="+mn-lt"/>
+              </a:rPr>
+              <a:t>faza</a:t>
+            </a:r>
+            <a:r>
+              <a:rPr lang="en-US" sz="2000" dirty="0">
+                <a:ea typeface="+mn-lt"/>
+                <a:cs typeface="+mn-lt"/>
+              </a:rPr>
+              <a:t> (</a:t>
+            </a:r>
+            <a:r>
+              <a:rPr lang="en-US" sz="2000" dirty="0" err="1">
+                <a:ea typeface="+mn-lt"/>
+                <a:cs typeface="+mn-lt"/>
+              </a:rPr>
+              <a:t>koje</a:t>
+            </a:r>
+            <a:r>
+              <a:rPr lang="en-US" sz="2000" dirty="0">
+                <a:ea typeface="+mn-lt"/>
+                <a:cs typeface="+mn-lt"/>
+              </a:rPr>
+              <a:t> se </a:t>
+            </a:r>
+            <a:r>
+              <a:rPr lang="en-US" sz="2000" dirty="0" err="1">
+                <a:ea typeface="+mn-lt"/>
+                <a:cs typeface="+mn-lt"/>
+              </a:rPr>
+              <a:t>ponavljaju</a:t>
+            </a:r>
+            <a:r>
+              <a:rPr lang="en-US" sz="2000" dirty="0">
+                <a:ea typeface="+mn-lt"/>
+                <a:cs typeface="+mn-lt"/>
+              </a:rPr>
+              <a:t> </a:t>
+            </a:r>
+            <a:r>
+              <a:rPr lang="en-US" sz="2000" dirty="0" err="1">
+                <a:ea typeface="+mn-lt"/>
+                <a:cs typeface="+mn-lt"/>
+              </a:rPr>
+              <a:t>kroz</a:t>
+            </a:r>
+            <a:r>
+              <a:rPr lang="en-US" sz="2000" dirty="0">
+                <a:ea typeface="+mn-lt"/>
+                <a:cs typeface="+mn-lt"/>
+              </a:rPr>
+              <a:t> </a:t>
+            </a:r>
+            <a:r>
+              <a:rPr lang="en-US" sz="2000" dirty="0" err="1">
+                <a:ea typeface="+mn-lt"/>
+                <a:cs typeface="+mn-lt"/>
+              </a:rPr>
+              <a:t>unapred</a:t>
+            </a:r>
+            <a:r>
+              <a:rPr lang="en-US" sz="2000" dirty="0">
+                <a:ea typeface="+mn-lt"/>
+                <a:cs typeface="+mn-lt"/>
+              </a:rPr>
+              <a:t> </a:t>
+            </a:r>
+            <a:r>
+              <a:rPr lang="en-US" sz="2000" dirty="0" err="1">
+                <a:ea typeface="+mn-lt"/>
+                <a:cs typeface="+mn-lt"/>
+              </a:rPr>
+              <a:t>definisan</a:t>
+            </a:r>
+            <a:r>
+              <a:rPr lang="en-US" sz="2000" dirty="0">
+                <a:ea typeface="+mn-lt"/>
+                <a:cs typeface="+mn-lt"/>
+              </a:rPr>
+              <a:t> </a:t>
+            </a:r>
+            <a:r>
+              <a:rPr lang="en-US" sz="2000" dirty="0" err="1">
+                <a:ea typeface="+mn-lt"/>
+                <a:cs typeface="+mn-lt"/>
+              </a:rPr>
+              <a:t>broj</a:t>
+            </a:r>
+            <a:r>
+              <a:rPr lang="en-US" sz="2000" dirty="0">
+                <a:ea typeface="+mn-lt"/>
+                <a:cs typeface="+mn-lt"/>
+              </a:rPr>
+              <a:t> </a:t>
+            </a:r>
+            <a:r>
+              <a:rPr lang="en-US" sz="2000" dirty="0" err="1">
+                <a:ea typeface="+mn-lt"/>
+                <a:cs typeface="+mn-lt"/>
+              </a:rPr>
+              <a:t>generacija</a:t>
+            </a:r>
+            <a:r>
+              <a:rPr lang="en-US" sz="2000" dirty="0">
+                <a:ea typeface="+mn-lt"/>
+                <a:cs typeface="+mn-lt"/>
+              </a:rPr>
+              <a:t>):</a:t>
+            </a:r>
+            <a:endParaRPr lang="sr-Latn-RS" dirty="0"/>
           </a:p>
           <a:p>
             <a:pPr lvl="1"/>
             <a:r>
-              <a:rPr lang="en-US" sz="2000"/>
-              <a:t>Inicijalizacija populacije</a:t>
-            </a:r>
-            <a:endParaRPr lang="sr-Latn-RS" sz="2000"/>
+              <a:rPr lang="en-US" sz="1600" err="1">
+                <a:ea typeface="+mn-lt"/>
+                <a:cs typeface="+mn-lt"/>
+              </a:rPr>
+              <a:t>Inicijalizacija</a:t>
+            </a:r>
+            <a:r>
+              <a:rPr lang="en-US" sz="1600" dirty="0">
+                <a:ea typeface="+mn-lt"/>
+                <a:cs typeface="+mn-lt"/>
+              </a:rPr>
+              <a:t> </a:t>
+            </a:r>
+            <a:r>
+              <a:rPr lang="en-US" sz="1600" err="1">
+                <a:ea typeface="+mn-lt"/>
+                <a:cs typeface="+mn-lt"/>
+              </a:rPr>
+              <a:t>populacije</a:t>
+            </a:r>
+            <a:r>
+              <a:rPr lang="en-US" sz="1600" dirty="0">
+                <a:ea typeface="+mn-lt"/>
+                <a:cs typeface="+mn-lt"/>
+              </a:rPr>
+              <a:t>,</a:t>
+            </a:r>
+            <a:endParaRPr lang="sr-Latn-RS" sz="1600"/>
           </a:p>
           <a:p>
             <a:pPr lvl="1"/>
             <a:r>
-              <a:rPr lang="en-US" sz="2000"/>
-              <a:t>Procena prilagođenosti (fitness)</a:t>
-            </a:r>
-            <a:endParaRPr lang="sr-Latn-RS" sz="2000"/>
+              <a:rPr lang="en-US" sz="1600" err="1">
+                <a:ea typeface="+mn-lt"/>
+                <a:cs typeface="+mn-lt"/>
+              </a:rPr>
+              <a:t>Procena</a:t>
+            </a:r>
+            <a:r>
+              <a:rPr lang="en-US" sz="1600" dirty="0">
+                <a:ea typeface="+mn-lt"/>
+                <a:cs typeface="+mn-lt"/>
+              </a:rPr>
+              <a:t> </a:t>
+            </a:r>
+            <a:r>
+              <a:rPr lang="en-US" sz="1600" err="1">
+                <a:ea typeface="+mn-lt"/>
+                <a:cs typeface="+mn-lt"/>
+              </a:rPr>
+              <a:t>prilagođenosti</a:t>
+            </a:r>
+            <a:r>
+              <a:rPr lang="en-US" sz="1600" dirty="0">
+                <a:ea typeface="+mn-lt"/>
+                <a:cs typeface="+mn-lt"/>
+              </a:rPr>
+              <a:t> (fitness),</a:t>
+            </a:r>
+            <a:endParaRPr lang="sr-Latn-RS" sz="1600"/>
           </a:p>
           <a:p>
             <a:pPr lvl="1"/>
             <a:r>
-              <a:rPr lang="en-US" sz="2000"/>
-              <a:t>Selekcija roditelja</a:t>
-            </a:r>
-            <a:endParaRPr lang="sr-Latn-RS" sz="2000"/>
+              <a:rPr lang="en-US" sz="1600" err="1">
+                <a:ea typeface="+mn-lt"/>
+                <a:cs typeface="+mn-lt"/>
+              </a:rPr>
+              <a:t>Selekcija</a:t>
+            </a:r>
+            <a:r>
+              <a:rPr lang="en-US" sz="1600" dirty="0">
+                <a:ea typeface="+mn-lt"/>
+                <a:cs typeface="+mn-lt"/>
+              </a:rPr>
+              <a:t> </a:t>
+            </a:r>
+            <a:r>
+              <a:rPr lang="en-US" sz="1600" err="1">
+                <a:ea typeface="+mn-lt"/>
+                <a:cs typeface="+mn-lt"/>
+              </a:rPr>
+              <a:t>roditelja</a:t>
+            </a:r>
+            <a:r>
+              <a:rPr lang="en-US" sz="1600" dirty="0">
+                <a:ea typeface="+mn-lt"/>
+                <a:cs typeface="+mn-lt"/>
+              </a:rPr>
+              <a:t>,</a:t>
+            </a:r>
+            <a:endParaRPr lang="sr-Latn-RS" sz="1600" dirty="0"/>
           </a:p>
           <a:p>
             <a:pPr lvl="1"/>
             <a:r>
-              <a:rPr lang="en-US" sz="2000"/>
+              <a:rPr lang="en-US" sz="1600" err="1">
+                <a:ea typeface="+mn-lt"/>
+                <a:cs typeface="+mn-lt"/>
+              </a:rPr>
               <a:t>Ukrštanje</a:t>
             </a:r>
-            <a:endParaRPr lang="sr-Latn-RS" sz="2000"/>
+            <a:r>
+              <a:rPr lang="en-US" sz="1600" dirty="0">
+                <a:ea typeface="+mn-lt"/>
+                <a:cs typeface="+mn-lt"/>
+              </a:rPr>
+              <a:t>,</a:t>
+            </a:r>
+            <a:endParaRPr lang="sr-Latn-RS" sz="1600" dirty="0"/>
           </a:p>
           <a:p>
             <a:pPr lvl="1"/>
             <a:r>
-              <a:rPr lang="en-US" sz="2000"/>
+              <a:rPr lang="en-US" sz="1600" err="1">
+                <a:ea typeface="+mn-lt"/>
+                <a:cs typeface="+mn-lt"/>
+              </a:rPr>
               <a:t>Mutacija</a:t>
             </a:r>
-            <a:endParaRPr lang="sr-Latn-RS" sz="2000"/>
+            <a:r>
+              <a:rPr lang="en-US" sz="1600" dirty="0">
+                <a:ea typeface="+mn-lt"/>
+                <a:cs typeface="+mn-lt"/>
+              </a:rPr>
+              <a:t>,</a:t>
+            </a:r>
+            <a:endParaRPr lang="sr-Latn-RS" sz="1600" dirty="0"/>
           </a:p>
           <a:p>
             <a:pPr lvl="1"/>
             <a:r>
-              <a:rPr lang="en-US" sz="2000"/>
-              <a:t>Elitizam i formiranje nove generacije.</a:t>
-            </a:r>
+              <a:rPr lang="en-US" sz="1600" err="1">
+                <a:ea typeface="+mn-lt"/>
+                <a:cs typeface="+mn-lt"/>
+              </a:rPr>
+              <a:t>Elitizam</a:t>
+            </a:r>
+            <a:r>
+              <a:rPr lang="en-US" sz="1600" dirty="0">
+                <a:ea typeface="+mn-lt"/>
+                <a:cs typeface="+mn-lt"/>
+              </a:rPr>
+              <a:t> </a:t>
+            </a:r>
+            <a:r>
+              <a:rPr lang="en-US" sz="1600" err="1">
+                <a:ea typeface="+mn-lt"/>
+                <a:cs typeface="+mn-lt"/>
+              </a:rPr>
+              <a:t>i</a:t>
+            </a:r>
+            <a:r>
+              <a:rPr lang="en-US" sz="1600" dirty="0">
+                <a:ea typeface="+mn-lt"/>
+                <a:cs typeface="+mn-lt"/>
+              </a:rPr>
+              <a:t> </a:t>
+            </a:r>
+            <a:r>
+              <a:rPr lang="en-US" sz="1600" err="1">
+                <a:ea typeface="+mn-lt"/>
+                <a:cs typeface="+mn-lt"/>
+              </a:rPr>
+              <a:t>formiranje</a:t>
+            </a:r>
+            <a:r>
+              <a:rPr lang="en-US" sz="1600" dirty="0">
+                <a:ea typeface="+mn-lt"/>
+                <a:cs typeface="+mn-lt"/>
+              </a:rPr>
+              <a:t> </a:t>
+            </a:r>
+            <a:r>
+              <a:rPr lang="en-US" sz="1600" err="1">
+                <a:ea typeface="+mn-lt"/>
+                <a:cs typeface="+mn-lt"/>
+              </a:rPr>
+              <a:t>nove</a:t>
+            </a:r>
+            <a:r>
+              <a:rPr lang="en-US" sz="1600" dirty="0">
+                <a:ea typeface="+mn-lt"/>
+                <a:cs typeface="+mn-lt"/>
+              </a:rPr>
+              <a:t> </a:t>
+            </a:r>
+            <a:r>
+              <a:rPr lang="en-US" sz="1600" err="1">
+                <a:ea typeface="+mn-lt"/>
+                <a:cs typeface="+mn-lt"/>
+              </a:rPr>
+              <a:t>generacije</a:t>
+            </a:r>
+            <a:r>
+              <a:rPr lang="en-US" sz="1600" dirty="0">
+                <a:ea typeface="+mn-lt"/>
+                <a:cs typeface="+mn-lt"/>
+              </a:rPr>
+              <a:t>.</a:t>
+            </a:r>
+            <a:endParaRPr lang="en-US" sz="1600">
+              <a:ea typeface="+mn-lt"/>
+              <a:cs typeface="+mn-lt"/>
+            </a:endParaRPr>
           </a:p>
         </p:txBody>
       </p:sp>

</xml_diff>